<commit_message>
add pie chart analyze
</commit_message>
<xml_diff>
--- a/Présentation_R_Projet.pptx
+++ b/Présentation_R_Projet.pptx
@@ -9,6 +9,7 @@
     <p:sldId id="258" r:id="rId3"/>
     <p:sldId id="259" r:id="rId4"/>
     <p:sldId id="260" r:id="rId5"/>
+    <p:sldId id="261" r:id="rId6"/>
   </p:sldIdLst>
   <p:sldSz cx="12192000" cy="6858000"/>
   <p:notesSz cx="6858000" cy="9144000"/>
@@ -6888,6 +6889,484 @@
 </p:sld>
 </file>
 
+<file path=ppt/slides/slide5.xml><?xml version="1.0" encoding="utf-8"?>
+<p:sld xmlns:a="http://schemas.openxmlformats.org/drawingml/2006/main" xmlns:r="http://schemas.openxmlformats.org/officeDocument/2006/relationships" xmlns:p="http://schemas.openxmlformats.org/presentationml/2006/main">
+  <p:cSld>
+    <p:spTree>
+      <p:nvGrpSpPr>
+        <p:cNvPr id="1" name=""/>
+        <p:cNvGrpSpPr/>
+        <p:nvPr/>
+      </p:nvGrpSpPr>
+      <p:grpSpPr>
+        <a:xfrm>
+          <a:off x="0" y="0"/>
+          <a:ext cx="0" cy="0"/>
+          <a:chOff x="0" y="0"/>
+          <a:chExt cx="0" cy="0"/>
+        </a:xfrm>
+      </p:grpSpPr>
+      <p:sp>
+        <p:nvSpPr>
+          <p:cNvPr id="10" name="ZoneTexte 9">
+            <a:extLst>
+              <a:ext uri="{FF2B5EF4-FFF2-40B4-BE49-F238E27FC236}">
+                <a16:creationId xmlns:a16="http://schemas.microsoft.com/office/drawing/2014/main" id="{F7B4297F-14F8-518E-FE68-97A88C957DDB}"/>
+              </a:ext>
+            </a:extLst>
+          </p:cNvPr>
+          <p:cNvSpPr txBox="1"/>
+          <p:nvPr/>
+        </p:nvSpPr>
+        <p:spPr>
+          <a:xfrm>
+            <a:off x="1852777" y="331126"/>
+            <a:ext cx="8303490" cy="400110"/>
+          </a:xfrm>
+          <a:prstGeom prst="rect">
+            <a:avLst/>
+          </a:prstGeom>
+          <a:noFill/>
+        </p:spPr>
+        <p:txBody>
+          <a:bodyPr wrap="square" rtlCol="0">
+            <a:spAutoFit/>
+          </a:bodyPr>
+          <a:lstStyle/>
+          <a:p>
+            <a:pPr algn="ctr"/>
+            <a:r>
+              <a:rPr lang="fr-FR" sz="2000" dirty="0"/>
+              <a:t>Tableau Genre avec corrélation de la cible (DEFAULT_PAYMENT) </a:t>
+            </a:r>
+          </a:p>
+        </p:txBody>
+      </p:sp>
+      <p:sp>
+        <p:nvSpPr>
+          <p:cNvPr id="2" name="Espace réservé du numéro de diapositive 3">
+            <a:extLst>
+              <a:ext uri="{FF2B5EF4-FFF2-40B4-BE49-F238E27FC236}">
+                <a16:creationId xmlns:a16="http://schemas.microsoft.com/office/drawing/2014/main" id="{B2A89CF8-EF06-5ACA-32E4-36F06435590D}"/>
+              </a:ext>
+            </a:extLst>
+          </p:cNvPr>
+          <p:cNvSpPr>
+            <a:spLocks noGrp="1"/>
+          </p:cNvSpPr>
+          <p:nvPr>
+            <p:ph type="sldNum" sz="quarter" idx="12"/>
+          </p:nvPr>
+        </p:nvSpPr>
+        <p:spPr>
+          <a:xfrm>
+            <a:off x="10352540" y="295729"/>
+            <a:ext cx="838199" cy="767687"/>
+          </a:xfrm>
+        </p:spPr>
+        <p:txBody>
+          <a:bodyPr/>
+          <a:lstStyle/>
+          <a:p>
+            <a:fld id="{756A6F2F-FAD6-4D10-A9E2-51EFC692D845}" type="slidenum">
+              <a:rPr lang="fr-FR" b="1" smtClean="0">
+                <a:solidFill>
+                  <a:schemeClr val="bg1"/>
+                </a:solidFill>
+              </a:rPr>
+              <a:t>5</a:t>
+            </a:fld>
+            <a:endParaRPr lang="fr-FR" b="1" dirty="0">
+              <a:solidFill>
+                <a:schemeClr val="bg1"/>
+              </a:solidFill>
+            </a:endParaRPr>
+          </a:p>
+        </p:txBody>
+      </p:sp>
+      <p:pic>
+        <p:nvPicPr>
+          <p:cNvPr id="3" name="Image 2" descr="Une image contenant texte&#10;&#10;Description générée automatiquement">
+            <a:extLst>
+              <a:ext uri="{FF2B5EF4-FFF2-40B4-BE49-F238E27FC236}">
+                <a16:creationId xmlns:a16="http://schemas.microsoft.com/office/drawing/2014/main" id="{1CC2762C-7FD2-F905-BDC1-F192AA0EF56A}"/>
+              </a:ext>
+            </a:extLst>
+          </p:cNvPr>
+          <p:cNvPicPr>
+            <a:picLocks noChangeAspect="1"/>
+          </p:cNvPicPr>
+          <p:nvPr/>
+        </p:nvPicPr>
+        <p:blipFill>
+          <a:blip r:embed="rId2">
+            <a:extLst>
+              <a:ext uri="{28A0092B-C50C-407E-A947-70E740481C1C}">
+                <a14:useLocalDpi xmlns:a14="http://schemas.microsoft.com/office/drawing/2010/main" val="0"/>
+              </a:ext>
+            </a:extLst>
+          </a:blip>
+          <a:stretch>
+            <a:fillRect/>
+          </a:stretch>
+        </p:blipFill>
+        <p:spPr>
+          <a:xfrm>
+            <a:off x="4117359" y="847365"/>
+            <a:ext cx="3018540" cy="1177636"/>
+          </a:xfrm>
+          <a:prstGeom prst="rect">
+            <a:avLst/>
+          </a:prstGeom>
+        </p:spPr>
+      </p:pic>
+      <p:pic>
+        <p:nvPicPr>
+          <p:cNvPr id="6" name="Image 5" descr="Une image contenant texte, route&#10;&#10;Description générée automatiquement">
+            <a:extLst>
+              <a:ext uri="{FF2B5EF4-FFF2-40B4-BE49-F238E27FC236}">
+                <a16:creationId xmlns:a16="http://schemas.microsoft.com/office/drawing/2014/main" id="{230EC72A-03C7-2BA8-12F4-B6781D48DD5D}"/>
+              </a:ext>
+            </a:extLst>
+          </p:cNvPr>
+          <p:cNvPicPr>
+            <a:picLocks noChangeAspect="1"/>
+          </p:cNvPicPr>
+          <p:nvPr/>
+        </p:nvPicPr>
+        <p:blipFill>
+          <a:blip r:embed="rId3">
+            <a:extLst>
+              <a:ext uri="{28A0092B-C50C-407E-A947-70E740481C1C}">
+                <a14:useLocalDpi xmlns:a14="http://schemas.microsoft.com/office/drawing/2010/main" val="0"/>
+              </a:ext>
+            </a:extLst>
+          </a:blip>
+          <a:stretch>
+            <a:fillRect/>
+          </a:stretch>
+        </p:blipFill>
+        <p:spPr>
+          <a:xfrm>
+            <a:off x="4430709" y="2636777"/>
+            <a:ext cx="2255367" cy="2122138"/>
+          </a:xfrm>
+          <a:prstGeom prst="rect">
+            <a:avLst/>
+          </a:prstGeom>
+        </p:spPr>
+      </p:pic>
+      <p:sp>
+        <p:nvSpPr>
+          <p:cNvPr id="7" name="ZoneTexte 6">
+            <a:extLst>
+              <a:ext uri="{FF2B5EF4-FFF2-40B4-BE49-F238E27FC236}">
+                <a16:creationId xmlns:a16="http://schemas.microsoft.com/office/drawing/2014/main" id="{99A15445-25A7-BB22-8FD8-E7B5CB97D589}"/>
+              </a:ext>
+            </a:extLst>
+          </p:cNvPr>
+          <p:cNvSpPr txBox="1"/>
+          <p:nvPr/>
+        </p:nvSpPr>
+        <p:spPr>
+          <a:xfrm>
+            <a:off x="1656504" y="2180576"/>
+            <a:ext cx="8696036" cy="400110"/>
+          </a:xfrm>
+          <a:prstGeom prst="rect">
+            <a:avLst/>
+          </a:prstGeom>
+          <a:noFill/>
+        </p:spPr>
+        <p:txBody>
+          <a:bodyPr wrap="square" rtlCol="0">
+            <a:spAutoFit/>
+          </a:bodyPr>
+          <a:lstStyle/>
+          <a:p>
+            <a:pPr algn="ctr"/>
+            <a:r>
+              <a:rPr lang="fr-FR" sz="2000" dirty="0"/>
+              <a:t>Tableau Education avec corrélation de la cible (DEFAULT_PAYMENT) </a:t>
+            </a:r>
+          </a:p>
+        </p:txBody>
+      </p:sp>
+      <p:sp>
+        <p:nvSpPr>
+          <p:cNvPr id="8" name="ZoneTexte 7">
+            <a:extLst>
+              <a:ext uri="{FF2B5EF4-FFF2-40B4-BE49-F238E27FC236}">
+                <a16:creationId xmlns:a16="http://schemas.microsoft.com/office/drawing/2014/main" id="{289EE2F4-EAF0-0D50-287D-577295C888B8}"/>
+              </a:ext>
+            </a:extLst>
+          </p:cNvPr>
+          <p:cNvSpPr txBox="1"/>
+          <p:nvPr/>
+        </p:nvSpPr>
+        <p:spPr>
+          <a:xfrm>
+            <a:off x="1852777" y="4860423"/>
+            <a:ext cx="8594436" cy="400110"/>
+          </a:xfrm>
+          <a:prstGeom prst="rect">
+            <a:avLst/>
+          </a:prstGeom>
+          <a:noFill/>
+        </p:spPr>
+        <p:txBody>
+          <a:bodyPr wrap="square" rtlCol="0">
+            <a:spAutoFit/>
+          </a:bodyPr>
+          <a:lstStyle/>
+          <a:p>
+            <a:pPr algn="ctr"/>
+            <a:r>
+              <a:rPr lang="fr-FR" sz="2000" dirty="0"/>
+              <a:t>Tableau Mariage avec corrélation de la cible (DEFAULT_PAYMENT) </a:t>
+            </a:r>
+          </a:p>
+        </p:txBody>
+      </p:sp>
+      <p:pic>
+        <p:nvPicPr>
+          <p:cNvPr id="11" name="Image 10" descr="Une image contenant texte&#10;&#10;Description générée automatiquement">
+            <a:extLst>
+              <a:ext uri="{FF2B5EF4-FFF2-40B4-BE49-F238E27FC236}">
+                <a16:creationId xmlns:a16="http://schemas.microsoft.com/office/drawing/2014/main" id="{7A9A340A-26AE-73E0-53D8-2787AB6A20D5}"/>
+              </a:ext>
+            </a:extLst>
+          </p:cNvPr>
+          <p:cNvPicPr>
+            <a:picLocks noChangeAspect="1"/>
+          </p:cNvPicPr>
+          <p:nvPr/>
+        </p:nvPicPr>
+        <p:blipFill>
+          <a:blip r:embed="rId4">
+            <a:extLst>
+              <a:ext uri="{28A0092B-C50C-407E-A947-70E740481C1C}">
+                <a14:useLocalDpi xmlns:a14="http://schemas.microsoft.com/office/drawing/2010/main" val="0"/>
+              </a:ext>
+            </a:extLst>
+          </a:blip>
+          <a:stretch>
+            <a:fillRect/>
+          </a:stretch>
+        </p:blipFill>
+        <p:spPr>
+          <a:xfrm>
+            <a:off x="4430709" y="5362042"/>
+            <a:ext cx="2705190" cy="1361988"/>
+          </a:xfrm>
+          <a:prstGeom prst="rect">
+            <a:avLst/>
+          </a:prstGeom>
+        </p:spPr>
+      </p:pic>
+      <p:sp>
+        <p:nvSpPr>
+          <p:cNvPr id="12" name="ZoneTexte 11">
+            <a:extLst>
+              <a:ext uri="{FF2B5EF4-FFF2-40B4-BE49-F238E27FC236}">
+                <a16:creationId xmlns:a16="http://schemas.microsoft.com/office/drawing/2014/main" id="{31F25449-1320-9824-3EC2-DFEEF935CFED}"/>
+              </a:ext>
+            </a:extLst>
+          </p:cNvPr>
+          <p:cNvSpPr txBox="1"/>
+          <p:nvPr/>
+        </p:nvSpPr>
+        <p:spPr>
+          <a:xfrm>
+            <a:off x="7135899" y="5858370"/>
+            <a:ext cx="4156364" cy="369332"/>
+          </a:xfrm>
+          <a:prstGeom prst="rect">
+            <a:avLst/>
+          </a:prstGeom>
+          <a:noFill/>
+        </p:spPr>
+        <p:txBody>
+          <a:bodyPr wrap="square" rtlCol="0">
+            <a:spAutoFit/>
+          </a:bodyPr>
+          <a:lstStyle/>
+          <a:p>
+            <a:pPr algn="ctr"/>
+            <a:r>
+              <a:rPr lang="en-US" dirty="0"/>
+              <a:t>1 = Married, 2 = Single, 3 = Others </a:t>
+            </a:r>
+            <a:endParaRPr lang="fr-FR" dirty="0"/>
+          </a:p>
+        </p:txBody>
+      </p:sp>
+      <p:sp>
+        <p:nvSpPr>
+          <p:cNvPr id="13" name="ZoneTexte 12">
+            <a:extLst>
+              <a:ext uri="{FF2B5EF4-FFF2-40B4-BE49-F238E27FC236}">
+                <a16:creationId xmlns:a16="http://schemas.microsoft.com/office/drawing/2014/main" id="{0BF6D0B6-E8D5-C82A-B6A2-5841322CB58E}"/>
+              </a:ext>
+            </a:extLst>
+          </p:cNvPr>
+          <p:cNvSpPr txBox="1"/>
+          <p:nvPr/>
+        </p:nvSpPr>
+        <p:spPr>
+          <a:xfrm>
+            <a:off x="6794702" y="3397389"/>
+            <a:ext cx="4497561" cy="646331"/>
+          </a:xfrm>
+          <a:prstGeom prst="rect">
+            <a:avLst/>
+          </a:prstGeom>
+          <a:noFill/>
+        </p:spPr>
+        <p:txBody>
+          <a:bodyPr wrap="square" rtlCol="0">
+            <a:spAutoFit/>
+          </a:bodyPr>
+          <a:lstStyle/>
+          <a:p>
+            <a:pPr algn="ctr"/>
+            <a:r>
+              <a:rPr lang="en-US" dirty="0"/>
+              <a:t>1 = Graduate School, 2 = University, </a:t>
+            </a:r>
+            <a:br>
+              <a:rPr lang="en-US" dirty="0"/>
+            </a:br>
+            <a:r>
+              <a:rPr lang="en-US" dirty="0"/>
+              <a:t>3 = High School, 4 = Others</a:t>
+            </a:r>
+            <a:endParaRPr lang="fr-FR" dirty="0"/>
+          </a:p>
+        </p:txBody>
+      </p:sp>
+      <p:sp>
+        <p:nvSpPr>
+          <p:cNvPr id="14" name="ZoneTexte 13">
+            <a:extLst>
+              <a:ext uri="{FF2B5EF4-FFF2-40B4-BE49-F238E27FC236}">
+                <a16:creationId xmlns:a16="http://schemas.microsoft.com/office/drawing/2014/main" id="{38C1E8BE-9765-7DBE-3B60-42BE8014CE38}"/>
+              </a:ext>
+            </a:extLst>
+          </p:cNvPr>
+          <p:cNvSpPr txBox="1"/>
+          <p:nvPr/>
+        </p:nvSpPr>
+        <p:spPr>
+          <a:xfrm>
+            <a:off x="7334000" y="1300726"/>
+            <a:ext cx="3018540" cy="369332"/>
+          </a:xfrm>
+          <a:prstGeom prst="rect">
+            <a:avLst/>
+          </a:prstGeom>
+          <a:noFill/>
+        </p:spPr>
+        <p:txBody>
+          <a:bodyPr wrap="square" rtlCol="0">
+            <a:spAutoFit/>
+          </a:bodyPr>
+          <a:lstStyle/>
+          <a:p>
+            <a:pPr algn="ctr"/>
+            <a:r>
+              <a:rPr lang="en-US" dirty="0"/>
+              <a:t>1 = Male, 2 = Female </a:t>
+            </a:r>
+            <a:endParaRPr lang="fr-FR" dirty="0"/>
+          </a:p>
+        </p:txBody>
+      </p:sp>
+      <p:sp>
+        <p:nvSpPr>
+          <p:cNvPr id="17" name="ZoneTexte 16">
+            <a:extLst>
+              <a:ext uri="{FF2B5EF4-FFF2-40B4-BE49-F238E27FC236}">
+                <a16:creationId xmlns:a16="http://schemas.microsoft.com/office/drawing/2014/main" id="{C39B03FB-3843-89D6-F797-2BD842E25434}"/>
+              </a:ext>
+            </a:extLst>
+          </p:cNvPr>
+          <p:cNvSpPr txBox="1"/>
+          <p:nvPr/>
+        </p:nvSpPr>
+        <p:spPr>
+          <a:xfrm>
+            <a:off x="0" y="954921"/>
+            <a:ext cx="2786342" cy="369332"/>
+          </a:xfrm>
+          <a:prstGeom prst="rect">
+            <a:avLst/>
+          </a:prstGeom>
+          <a:noFill/>
+        </p:spPr>
+        <p:txBody>
+          <a:bodyPr wrap="square" rtlCol="0">
+            <a:spAutoFit/>
+          </a:bodyPr>
+          <a:lstStyle/>
+          <a:p>
+            <a:pPr algn="ctr"/>
+            <a:r>
+              <a:rPr lang="fr-FR" dirty="0"/>
+              <a:t>1 = Défaut Paiement</a:t>
+            </a:r>
+          </a:p>
+        </p:txBody>
+      </p:sp>
+      <p:sp>
+        <p:nvSpPr>
+          <p:cNvPr id="20" name="ZoneTexte 19">
+            <a:extLst>
+              <a:ext uri="{FF2B5EF4-FFF2-40B4-BE49-F238E27FC236}">
+                <a16:creationId xmlns:a16="http://schemas.microsoft.com/office/drawing/2014/main" id="{62982628-E50A-2873-12A8-EEE5B52FB5CB}"/>
+              </a:ext>
+            </a:extLst>
+          </p:cNvPr>
+          <p:cNvSpPr txBox="1"/>
+          <p:nvPr/>
+        </p:nvSpPr>
+        <p:spPr>
+          <a:xfrm>
+            <a:off x="90957" y="1271240"/>
+            <a:ext cx="3812068" cy="369332"/>
+          </a:xfrm>
+          <a:prstGeom prst="rect">
+            <a:avLst/>
+          </a:prstGeom>
+          <a:noFill/>
+        </p:spPr>
+        <p:txBody>
+          <a:bodyPr wrap="square" rtlCol="0">
+            <a:spAutoFit/>
+          </a:bodyPr>
+          <a:lstStyle/>
+          <a:p>
+            <a:pPr algn="ctr"/>
+            <a:r>
+              <a:rPr lang="fr-FR" dirty="0"/>
+              <a:t>0 = Pas de défaut de paiement</a:t>
+            </a:r>
+          </a:p>
+        </p:txBody>
+      </p:sp>
+    </p:spTree>
+    <p:extLst>
+      <p:ext uri="{BB962C8B-B14F-4D97-AF65-F5344CB8AC3E}">
+        <p14:creationId xmlns:p14="http://schemas.microsoft.com/office/powerpoint/2010/main" val="2353690274"/>
+      </p:ext>
+    </p:extLst>
+  </p:cSld>
+  <p:clrMapOvr>
+    <a:masterClrMapping/>
+  </p:clrMapOvr>
+</p:sld>
+</file>
+
 <file path=ppt/theme/theme1.xml><?xml version="1.0" encoding="utf-8"?>
 <a:theme xmlns:a="http://schemas.openxmlformats.org/drawingml/2006/main" name="Ion">
   <a:themeElements>

</xml_diff>